<commit_message>
candidate by state endpoint and infrastructure
Added infrastructure to standardize the placement of sql for building
the working tables and for building the endpoints/materialized views.
As well I added endpoints to get candidate transaction totals by state.
</commit_message>
<xml_diff>
--- a/infrastructure.pptx
+++ b/infrastructure.pptx
@@ -296,7 +296,7 @@
             <a:fld id="{7C061FE0-E704-BF41-9DC4-C765A7BE7CEB}" type="datetimeFigureOut">
               <a:rPr lang="en-US" smtClean="0"/>
               <a:pPr/>
-              <a:t>8/27/14</a:t>
+              <a:t>9/10/14</a:t>
             </a:fld>
             <a:endParaRPr lang="en-US"/>
           </a:p>
@@ -463,7 +463,7 @@
             <a:fld id="{7C061FE0-E704-BF41-9DC4-C765A7BE7CEB}" type="datetimeFigureOut">
               <a:rPr lang="en-US" smtClean="0"/>
               <a:pPr/>
-              <a:t>8/27/14</a:t>
+              <a:t>9/10/14</a:t>
             </a:fld>
             <a:endParaRPr lang="en-US"/>
           </a:p>
@@ -640,7 +640,7 @@
             <a:fld id="{7C061FE0-E704-BF41-9DC4-C765A7BE7CEB}" type="datetimeFigureOut">
               <a:rPr lang="en-US" smtClean="0"/>
               <a:pPr/>
-              <a:t>8/27/14</a:t>
+              <a:t>9/10/14</a:t>
             </a:fld>
             <a:endParaRPr lang="en-US"/>
           </a:p>
@@ -807,7 +807,7 @@
             <a:fld id="{7C061FE0-E704-BF41-9DC4-C765A7BE7CEB}" type="datetimeFigureOut">
               <a:rPr lang="en-US" smtClean="0"/>
               <a:pPr/>
-              <a:t>8/27/14</a:t>
+              <a:t>9/10/14</a:t>
             </a:fld>
             <a:endParaRPr lang="en-US"/>
           </a:p>
@@ -1050,7 +1050,7 @@
             <a:fld id="{7C061FE0-E704-BF41-9DC4-C765A7BE7CEB}" type="datetimeFigureOut">
               <a:rPr lang="en-US" smtClean="0"/>
               <a:pPr/>
-              <a:t>8/27/14</a:t>
+              <a:t>9/10/14</a:t>
             </a:fld>
             <a:endParaRPr lang="en-US"/>
           </a:p>
@@ -1335,7 +1335,7 @@
             <a:fld id="{7C061FE0-E704-BF41-9DC4-C765A7BE7CEB}" type="datetimeFigureOut">
               <a:rPr lang="en-US" smtClean="0"/>
               <a:pPr/>
-              <a:t>8/27/14</a:t>
+              <a:t>9/10/14</a:t>
             </a:fld>
             <a:endParaRPr lang="en-US"/>
           </a:p>
@@ -1754,7 +1754,7 @@
             <a:fld id="{7C061FE0-E704-BF41-9DC4-C765A7BE7CEB}" type="datetimeFigureOut">
               <a:rPr lang="en-US" smtClean="0"/>
               <a:pPr/>
-              <a:t>8/27/14</a:t>
+              <a:t>9/10/14</a:t>
             </a:fld>
             <a:endParaRPr lang="en-US"/>
           </a:p>
@@ -1869,7 +1869,7 @@
             <a:fld id="{7C061FE0-E704-BF41-9DC4-C765A7BE7CEB}" type="datetimeFigureOut">
               <a:rPr lang="en-US" smtClean="0"/>
               <a:pPr/>
-              <a:t>8/27/14</a:t>
+              <a:t>9/10/14</a:t>
             </a:fld>
             <a:endParaRPr lang="en-US"/>
           </a:p>
@@ -1961,7 +1961,7 @@
             <a:fld id="{7C061FE0-E704-BF41-9DC4-C765A7BE7CEB}" type="datetimeFigureOut">
               <a:rPr lang="en-US" smtClean="0"/>
               <a:pPr/>
-              <a:t>8/27/14</a:t>
+              <a:t>9/10/14</a:t>
             </a:fld>
             <a:endParaRPr lang="en-US"/>
           </a:p>
@@ -2235,7 +2235,7 @@
             <a:fld id="{7C061FE0-E704-BF41-9DC4-C765A7BE7CEB}" type="datetimeFigureOut">
               <a:rPr lang="en-US" smtClean="0"/>
               <a:pPr/>
-              <a:t>8/27/14</a:t>
+              <a:t>9/10/14</a:t>
             </a:fld>
             <a:endParaRPr lang="en-US"/>
           </a:p>
@@ -2485,7 +2485,7 @@
             <a:fld id="{7C061FE0-E704-BF41-9DC4-C765A7BE7CEB}" type="datetimeFigureOut">
               <a:rPr lang="en-US" smtClean="0"/>
               <a:pPr/>
-              <a:t>8/27/14</a:t>
+              <a:t>9/10/14</a:t>
             </a:fld>
             <a:endParaRPr lang="en-US"/>
           </a:p>
@@ -2695,7 +2695,7 @@
             <a:fld id="{7C061FE0-E704-BF41-9DC4-C765A7BE7CEB}" type="datetimeFigureOut">
               <a:rPr lang="en-US" smtClean="0"/>
               <a:pPr/>
-              <a:t>8/27/14</a:t>
+              <a:t>9/10/14</a:t>
             </a:fld>
             <a:endParaRPr lang="en-US"/>
           </a:p>
@@ -4240,7 +4240,7 @@
         </p:nvSpPr>
         <p:spPr>
           <a:xfrm>
-            <a:off x="360893" y="0"/>
+            <a:off x="389027" y="-287775"/>
             <a:ext cx="8229600" cy="1143000"/>
           </a:xfrm>
         </p:spPr>
@@ -4266,15 +4266,17 @@
         </p:nvSpPr>
         <p:spPr>
           <a:xfrm>
-            <a:off x="389027" y="1419684"/>
-            <a:ext cx="1853098" cy="984805"/>
+            <a:off x="236628" y="804182"/>
+            <a:ext cx="1853098" cy="802605"/>
           </a:xfrm>
           <a:prstGeom prst="rect">
             <a:avLst/>
           </a:prstGeom>
           <a:ln>
             <a:solidFill>
-              <a:schemeClr val="tx1"/>
+              <a:schemeClr val="tx1">
+                <a:lumMod val="75000"/>
+              </a:schemeClr>
             </a:solidFill>
           </a:ln>
         </p:spPr>
@@ -4313,15 +4315,17 @@
         </p:nvSpPr>
         <p:spPr>
           <a:xfrm>
-            <a:off x="4189042" y="1296585"/>
-            <a:ext cx="1853098" cy="984805"/>
+            <a:off x="4114662" y="804182"/>
+            <a:ext cx="1853098" cy="802605"/>
           </a:xfrm>
           <a:prstGeom prst="rect">
             <a:avLst/>
           </a:prstGeom>
           <a:ln>
             <a:solidFill>
-              <a:schemeClr val="tx1"/>
+              <a:schemeClr val="tx1">
+                <a:lumMod val="75000"/>
+              </a:schemeClr>
             </a:solidFill>
           </a:ln>
         </p:spPr>
@@ -4360,15 +4364,17 @@
         </p:nvSpPr>
         <p:spPr>
           <a:xfrm>
-            <a:off x="385654" y="2806190"/>
-            <a:ext cx="5818468" cy="609024"/>
+            <a:off x="988234" y="1852991"/>
+            <a:ext cx="4276379" cy="323946"/>
           </a:xfrm>
           <a:prstGeom prst="rect">
             <a:avLst/>
           </a:prstGeom>
           <a:ln>
             <a:solidFill>
-              <a:schemeClr val="tx1"/>
+              <a:schemeClr val="tx1">
+                <a:lumMod val="75000"/>
+              </a:schemeClr>
             </a:solidFill>
           </a:ln>
         </p:spPr>
@@ -4393,9 +4399,8 @@
             <a:pPr algn="ctr"/>
             <a:r>
               <a:rPr lang="en-US" dirty="0" smtClean="0"/>
-              <a:t>Cleaning steps</a:t>
-            </a:r>
-            <a:endParaRPr lang="en-US" dirty="0"/>
+              <a:t>Initial cleaning steps</a:t>
+            </a:r>
           </a:p>
         </p:txBody>
       </p:sp>
@@ -4407,7 +4412,7 @@
         </p:nvSpPr>
         <p:spPr>
           <a:xfrm>
-            <a:off x="385654" y="3868742"/>
+            <a:off x="333818" y="2378572"/>
             <a:ext cx="1853098" cy="492403"/>
           </a:xfrm>
           <a:prstGeom prst="rect">
@@ -4415,7 +4420,9 @@
           </a:prstGeom>
           <a:ln>
             <a:solidFill>
-              <a:schemeClr val="tx1"/>
+              <a:schemeClr val="tx1">
+                <a:lumMod val="75000"/>
+              </a:schemeClr>
             </a:solidFill>
           </a:ln>
         </p:spPr>
@@ -4454,7 +4461,7 @@
         </p:nvSpPr>
         <p:spPr>
           <a:xfrm>
-            <a:off x="4351024" y="3868742"/>
+            <a:off x="4299188" y="2352656"/>
             <a:ext cx="1853098" cy="492403"/>
           </a:xfrm>
           <a:prstGeom prst="rect">
@@ -4462,7 +4469,9 @@
           </a:prstGeom>
           <a:ln>
             <a:solidFill>
-              <a:schemeClr val="tx1"/>
+              <a:schemeClr val="tx1">
+                <a:lumMod val="75000"/>
+              </a:schemeClr>
             </a:solidFill>
           </a:ln>
         </p:spPr>
@@ -4501,7 +4510,7 @@
         </p:nvSpPr>
         <p:spPr>
           <a:xfrm>
-            <a:off x="2621034" y="3881701"/>
+            <a:off x="2569198" y="2300825"/>
             <a:ext cx="1253891" cy="894099"/>
           </a:xfrm>
           <a:prstGeom prst="can">
@@ -4509,7 +4518,9 @@
           </a:prstGeom>
           <a:ln>
             <a:solidFill>
-              <a:schemeClr val="tx1"/>
+              <a:schemeClr val="tx1">
+                <a:lumMod val="75000"/>
+              </a:schemeClr>
             </a:solidFill>
           </a:ln>
         </p:spPr>
@@ -4534,7 +4545,7 @@
             <a:pPr algn="ctr"/>
             <a:r>
               <a:rPr lang="en-US" dirty="0" smtClean="0"/>
-              <a:t>Primary</a:t>
+              <a:t>raw</a:t>
             </a:r>
           </a:p>
           <a:p>
@@ -4549,21 +4560,23 @@
       </p:sp>
       <p:sp>
         <p:nvSpPr>
-          <p:cNvPr id="10" name="Rectangle 9"/>
+          <p:cNvPr id="11" name="Rectangle 10"/>
           <p:cNvSpPr/>
           <p:nvPr/>
         </p:nvSpPr>
         <p:spPr>
           <a:xfrm>
-            <a:off x="554118" y="5022001"/>
-            <a:ext cx="5413642" cy="323949"/>
+            <a:off x="385654" y="6152621"/>
+            <a:ext cx="1904933" cy="323949"/>
           </a:xfrm>
           <a:prstGeom prst="rect">
             <a:avLst/>
           </a:prstGeom>
           <a:ln>
             <a:solidFill>
-              <a:schemeClr val="tx1"/>
+              <a:schemeClr val="tx1">
+                <a:lumMod val="75000"/>
+              </a:schemeClr>
             </a:solidFill>
           </a:ln>
         </p:spPr>
@@ -4588,7 +4601,7 @@
             <a:pPr algn="ctr"/>
             <a:r>
               <a:rPr lang="en-US" dirty="0" smtClean="0"/>
-              <a:t>Working table creation (data work up scripts)</a:t>
+              <a:t>Working tables</a:t>
             </a:r>
             <a:endParaRPr lang="en-US" dirty="0"/>
           </a:p>
@@ -4596,13 +4609,13 @@
       </p:sp>
       <p:sp>
         <p:nvSpPr>
-          <p:cNvPr id="11" name="Rectangle 10"/>
+          <p:cNvPr id="12" name="Rectangle 11"/>
           <p:cNvSpPr/>
           <p:nvPr/>
         </p:nvSpPr>
         <p:spPr>
           <a:xfrm>
-            <a:off x="389027" y="5721729"/>
+            <a:off x="2442719" y="6152621"/>
             <a:ext cx="1904933" cy="323949"/>
           </a:xfrm>
           <a:prstGeom prst="rect">
@@ -4610,7 +4623,9 @@
           </a:prstGeom>
           <a:ln>
             <a:solidFill>
-              <a:schemeClr val="tx1"/>
+              <a:schemeClr val="tx1">
+                <a:lumMod val="75000"/>
+              </a:schemeClr>
             </a:solidFill>
           </a:ln>
         </p:spPr>
@@ -4643,21 +4658,23 @@
       </p:sp>
       <p:sp>
         <p:nvSpPr>
-          <p:cNvPr id="12" name="Rectangle 11"/>
+          <p:cNvPr id="13" name="Rectangle 12"/>
           <p:cNvSpPr/>
           <p:nvPr/>
         </p:nvSpPr>
         <p:spPr>
           <a:xfrm>
-            <a:off x="2446092" y="5721729"/>
-            <a:ext cx="1904933" cy="323949"/>
+            <a:off x="4674992" y="6152622"/>
+            <a:ext cx="2246477" cy="485923"/>
           </a:xfrm>
           <a:prstGeom prst="rect">
             <a:avLst/>
           </a:prstGeom>
           <a:ln>
             <a:solidFill>
-              <a:schemeClr val="tx1"/>
+              <a:schemeClr val="tx1">
+                <a:lumMod val="75000"/>
+              </a:schemeClr>
             </a:solidFill>
           </a:ln>
         </p:spPr>
@@ -4682,7 +4699,7 @@
             <a:pPr algn="ctr"/>
             <a:r>
               <a:rPr lang="en-US" dirty="0" smtClean="0"/>
-              <a:t>Working tables</a:t>
+              <a:t>Joined, aggregated datasets</a:t>
             </a:r>
             <a:endParaRPr lang="en-US" dirty="0"/>
           </a:p>
@@ -4690,13 +4707,13 @@
       </p:sp>
       <p:sp>
         <p:nvSpPr>
-          <p:cNvPr id="13" name="Rectangle 12"/>
+          <p:cNvPr id="14" name="Rectangle 13"/>
           <p:cNvSpPr/>
           <p:nvPr/>
         </p:nvSpPr>
         <p:spPr>
           <a:xfrm>
-            <a:off x="4678365" y="5721730"/>
+            <a:off x="1133886" y="6314597"/>
             <a:ext cx="1904933" cy="323949"/>
           </a:xfrm>
           <a:prstGeom prst="rect">
@@ -4704,7 +4721,9 @@
           </a:prstGeom>
           <a:ln>
             <a:solidFill>
-              <a:schemeClr val="tx1"/>
+              <a:schemeClr val="tx1">
+                <a:lumMod val="75000"/>
+              </a:schemeClr>
             </a:solidFill>
           </a:ln>
         </p:spPr>
@@ -4729,7 +4748,7 @@
             <a:pPr algn="ctr"/>
             <a:r>
               <a:rPr lang="en-US" dirty="0" smtClean="0"/>
-              <a:t>Working tables</a:t>
+              <a:t>materialized views </a:t>
             </a:r>
             <a:endParaRPr lang="en-US" dirty="0"/>
           </a:p>
@@ -4737,13 +4756,13 @@
       </p:sp>
       <p:sp>
         <p:nvSpPr>
-          <p:cNvPr id="14" name="Rectangle 13"/>
+          <p:cNvPr id="15" name="Rectangle 14"/>
           <p:cNvSpPr/>
           <p:nvPr/>
         </p:nvSpPr>
         <p:spPr>
           <a:xfrm>
-            <a:off x="1137259" y="5883704"/>
+            <a:off x="3395184" y="6421540"/>
             <a:ext cx="1904933" cy="323949"/>
           </a:xfrm>
           <a:prstGeom prst="rect">
@@ -4751,7 +4770,9 @@
           </a:prstGeom>
           <a:ln>
             <a:solidFill>
-              <a:schemeClr val="tx1"/>
+              <a:schemeClr val="tx1">
+                <a:lumMod val="75000"/>
+              </a:schemeClr>
             </a:solidFill>
           </a:ln>
         </p:spPr>
@@ -4776,54 +4797,7 @@
             <a:pPr algn="ctr"/>
             <a:r>
               <a:rPr lang="en-US" dirty="0" smtClean="0"/>
-              <a:t>Working tables</a:t>
-            </a:r>
-            <a:endParaRPr lang="en-US" dirty="0"/>
-          </a:p>
-        </p:txBody>
-      </p:sp>
-      <p:sp>
-        <p:nvSpPr>
-          <p:cNvPr id="15" name="Rectangle 14"/>
-          <p:cNvSpPr/>
-          <p:nvPr/>
-        </p:nvSpPr>
-        <p:spPr>
-          <a:xfrm>
-            <a:off x="3398557" y="5883704"/>
-            <a:ext cx="1904933" cy="323949"/>
-          </a:xfrm>
-          <a:prstGeom prst="rect">
-            <a:avLst/>
-          </a:prstGeom>
-          <a:ln>
-            <a:solidFill>
-              <a:schemeClr val="tx1"/>
-            </a:solidFill>
-          </a:ln>
-        </p:spPr>
-        <p:style>
-          <a:lnRef idx="1">
-            <a:schemeClr val="accent1"/>
-          </a:lnRef>
-          <a:fillRef idx="3">
-            <a:schemeClr val="accent1"/>
-          </a:fillRef>
-          <a:effectRef idx="2">
-            <a:schemeClr val="accent1"/>
-          </a:effectRef>
-          <a:fontRef idx="minor">
-            <a:schemeClr val="lt1"/>
-          </a:fontRef>
-        </p:style>
-        <p:txBody>
-          <a:bodyPr rtlCol="0" anchor="ctr"/>
-          <a:lstStyle/>
-          <a:p>
-            <a:pPr algn="ctr"/>
-            <a:r>
-              <a:rPr lang="en-US" dirty="0" smtClean="0"/>
-              <a:t>Working tables</a:t>
+              <a:t>endpoint-specific</a:t>
             </a:r>
             <a:endParaRPr lang="en-US" dirty="0"/>
           </a:p>
@@ -4837,15 +4811,17 @@
         </p:nvCxnSpPr>
         <p:spPr>
           <a:xfrm rot="16200000" flipH="1">
-            <a:off x="1111358" y="2605339"/>
-            <a:ext cx="401700" cy="2"/>
+            <a:off x="1014159" y="1729887"/>
+            <a:ext cx="246203" cy="2"/>
           </a:xfrm>
           <a:prstGeom prst="straightConnector1">
             <a:avLst/>
           </a:prstGeom>
           <a:ln>
             <a:solidFill>
-              <a:schemeClr val="tx1"/>
+              <a:schemeClr val="tx1">
+                <a:lumMod val="75000"/>
+              </a:schemeClr>
             </a:solidFill>
             <a:tailEnd type="arrow"/>
           </a:ln>
@@ -4872,16 +4848,18 @@
           <p:nvPr/>
         </p:nvCxnSpPr>
         <p:spPr>
-          <a:xfrm rot="5400000">
-            <a:off x="4853189" y="2543790"/>
-            <a:ext cx="524799" cy="1588"/>
+          <a:xfrm rot="16200000" flipH="1">
+            <a:off x="4991297" y="1728696"/>
+            <a:ext cx="246203" cy="2385"/>
           </a:xfrm>
           <a:prstGeom prst="straightConnector1">
             <a:avLst/>
           </a:prstGeom>
           <a:ln>
             <a:solidFill>
-              <a:schemeClr val="tx1"/>
+              <a:schemeClr val="tx1">
+                <a:lumMod val="75000"/>
+              </a:schemeClr>
             </a:solidFill>
             <a:tailEnd type="arrow"/>
           </a:ln>
@@ -4908,16 +4886,18 @@
           <p:nvPr/>
         </p:nvCxnSpPr>
         <p:spPr>
-          <a:xfrm rot="16200000" flipH="1">
-            <a:off x="1111356" y="3667891"/>
-            <a:ext cx="401700" cy="2"/>
+          <a:xfrm rot="5400000">
+            <a:off x="1163582" y="2255071"/>
+            <a:ext cx="193575" cy="1588"/>
           </a:xfrm>
           <a:prstGeom prst="straightConnector1">
             <a:avLst/>
           </a:prstGeom>
           <a:ln>
             <a:solidFill>
-              <a:schemeClr val="tx1"/>
+              <a:schemeClr val="tx1">
+                <a:lumMod val="75000"/>
+              </a:schemeClr>
             </a:solidFill>
             <a:tailEnd type="arrow"/>
           </a:ln>
@@ -4945,15 +4925,17 @@
         </p:nvCxnSpPr>
         <p:spPr>
           <a:xfrm rot="16200000" flipH="1">
-            <a:off x="4914740" y="3667891"/>
-            <a:ext cx="401700" cy="2"/>
+            <a:off x="4979528" y="2268425"/>
+            <a:ext cx="168453" cy="2"/>
           </a:xfrm>
           <a:prstGeom prst="straightConnector1">
             <a:avLst/>
           </a:prstGeom>
           <a:ln>
             <a:solidFill>
-              <a:schemeClr val="tx1"/>
+              <a:schemeClr val="tx1">
+                <a:lumMod val="75000"/>
+              </a:schemeClr>
             </a:solidFill>
             <a:tailEnd type="arrow"/>
           </a:ln>
@@ -4978,21 +4960,23 @@
           <p:cNvPr id="23" name="Straight Arrow Connector 22"/>
           <p:cNvCxnSpPr>
             <a:stCxn id="9" idx="3"/>
-            <a:endCxn id="10" idx="0"/>
+            <a:endCxn id="39" idx="0"/>
           </p:cNvCxnSpPr>
           <p:nvPr/>
         </p:nvCxnSpPr>
         <p:spPr>
           <a:xfrm rot="16200000" flipH="1">
-            <a:off x="3131359" y="4892420"/>
-            <a:ext cx="246201" cy="12959"/>
+            <a:off x="2969515" y="3421552"/>
+            <a:ext cx="453258" cy="1"/>
           </a:xfrm>
           <a:prstGeom prst="straightConnector1">
             <a:avLst/>
           </a:prstGeom>
           <a:ln>
             <a:solidFill>
-              <a:schemeClr val="tx1"/>
+              <a:schemeClr val="tx1">
+                <a:lumMod val="75000"/>
+              </a:schemeClr>
             </a:solidFill>
             <a:tailEnd type="arrow"/>
           </a:ln>
@@ -5023,15 +5007,17 @@
         </p:nvCxnSpPr>
         <p:spPr>
           <a:xfrm rot="10800000" flipV="1">
-            <a:off x="3874926" y="4114943"/>
-            <a:ext cx="476099" cy="213807"/>
+            <a:off x="3823090" y="2598857"/>
+            <a:ext cx="476099" cy="149017"/>
           </a:xfrm>
           <a:prstGeom prst="straightConnector1">
             <a:avLst/>
           </a:prstGeom>
           <a:ln>
             <a:solidFill>
-              <a:schemeClr val="tx1"/>
+              <a:schemeClr val="tx1">
+                <a:lumMod val="75000"/>
+              </a:schemeClr>
             </a:solidFill>
             <a:tailEnd type="arrow"/>
           </a:ln>
@@ -5062,15 +5048,17 @@
         </p:nvCxnSpPr>
         <p:spPr>
           <a:xfrm>
-            <a:off x="2238752" y="4114944"/>
-            <a:ext cx="382282" cy="213807"/>
+            <a:off x="2186916" y="2624774"/>
+            <a:ext cx="382282" cy="123101"/>
           </a:xfrm>
           <a:prstGeom prst="straightConnector1">
             <a:avLst/>
           </a:prstGeom>
           <a:ln>
             <a:solidFill>
-              <a:schemeClr val="tx1"/>
+              <a:schemeClr val="tx1">
+                <a:lumMod val="75000"/>
+              </a:schemeClr>
             </a:solidFill>
             <a:tailEnd type="arrow"/>
           </a:ln>
@@ -5094,21 +5082,24 @@
         <p:nvCxnSpPr>
           <p:cNvPr id="32" name="Straight Arrow Connector 31"/>
           <p:cNvCxnSpPr>
-            <a:stCxn id="10" idx="2"/>
+            <a:stCxn id="95" idx="2"/>
+            <a:endCxn id="11" idx="0"/>
           </p:cNvCxnSpPr>
           <p:nvPr/>
         </p:nvCxnSpPr>
         <p:spPr>
           <a:xfrm rot="5400000">
-            <a:off x="2098683" y="4559474"/>
-            <a:ext cx="375780" cy="1948732"/>
+            <a:off x="2169241" y="5100151"/>
+            <a:ext cx="221350" cy="1883590"/>
           </a:xfrm>
           <a:prstGeom prst="straightConnector1">
             <a:avLst/>
           </a:prstGeom>
           <a:ln>
             <a:solidFill>
-              <a:schemeClr val="tx1"/>
+              <a:schemeClr val="tx1">
+                <a:lumMod val="75000"/>
+              </a:schemeClr>
             </a:solidFill>
             <a:tailEnd type="arrow"/>
           </a:ln>
@@ -5132,21 +5123,24 @@
         <p:nvCxnSpPr>
           <p:cNvPr id="34" name="Straight Arrow Connector 33"/>
           <p:cNvCxnSpPr>
-            <a:stCxn id="10" idx="2"/>
+            <a:stCxn id="95" idx="2"/>
+            <a:endCxn id="12" idx="0"/>
           </p:cNvCxnSpPr>
           <p:nvPr/>
         </p:nvCxnSpPr>
         <p:spPr>
-          <a:xfrm rot="5400000">
-            <a:off x="3073049" y="5533840"/>
-            <a:ext cx="375780" cy="1588"/>
+          <a:xfrm rot="16200000" flipH="1">
+            <a:off x="3197773" y="5955208"/>
+            <a:ext cx="221350" cy="173475"/>
           </a:xfrm>
           <a:prstGeom prst="straightConnector1">
             <a:avLst/>
           </a:prstGeom>
           <a:ln>
             <a:solidFill>
-              <a:schemeClr val="tx1"/>
+              <a:schemeClr val="tx1">
+                <a:lumMod val="75000"/>
+              </a:schemeClr>
             </a:solidFill>
             <a:tailEnd type="arrow"/>
           </a:ln>
@@ -5170,21 +5164,24 @@
         <p:nvCxnSpPr>
           <p:cNvPr id="36" name="Straight Arrow Connector 35"/>
           <p:cNvCxnSpPr>
-            <a:stCxn id="10" idx="2"/>
+            <a:stCxn id="95" idx="2"/>
+            <a:endCxn id="13" idx="0"/>
           </p:cNvCxnSpPr>
           <p:nvPr/>
         </p:nvCxnSpPr>
         <p:spPr>
           <a:xfrm rot="16200000" flipH="1">
-            <a:off x="4426062" y="4180826"/>
-            <a:ext cx="376574" cy="2706821"/>
+            <a:off x="4399296" y="4753686"/>
+            <a:ext cx="221351" cy="2576520"/>
           </a:xfrm>
           <a:prstGeom prst="straightConnector1">
             <a:avLst/>
           </a:prstGeom>
           <a:ln>
             <a:solidFill>
-              <a:schemeClr val="tx1"/>
+              <a:schemeClr val="tx1">
+                <a:lumMod val="75000"/>
+              </a:schemeClr>
             </a:solidFill>
             <a:tailEnd type="arrow"/>
           </a:ln>
@@ -5208,22 +5205,24 @@
         <p:nvCxnSpPr>
           <p:cNvPr id="38" name="Straight Arrow Connector 37"/>
           <p:cNvCxnSpPr>
-            <a:stCxn id="10" idx="2"/>
+            <a:stCxn id="95" idx="2"/>
             <a:endCxn id="15" idx="0"/>
           </p:cNvCxnSpPr>
           <p:nvPr/>
         </p:nvCxnSpPr>
         <p:spPr>
           <a:xfrm rot="16200000" flipH="1">
-            <a:off x="3537104" y="5069784"/>
-            <a:ext cx="537754" cy="1090085"/>
+            <a:off x="3539547" y="5613435"/>
+            <a:ext cx="490269" cy="1125940"/>
           </a:xfrm>
           <a:prstGeom prst="straightConnector1">
             <a:avLst/>
           </a:prstGeom>
           <a:ln>
             <a:solidFill>
-              <a:schemeClr val="tx1"/>
+              <a:schemeClr val="tx1">
+                <a:lumMod val="75000"/>
+              </a:schemeClr>
             </a:solidFill>
             <a:tailEnd type="arrow"/>
           </a:ln>
@@ -5247,22 +5246,24 @@
         <p:nvCxnSpPr>
           <p:cNvPr id="40" name="Straight Arrow Connector 39"/>
           <p:cNvCxnSpPr>
-            <a:stCxn id="10" idx="2"/>
+            <a:stCxn id="95" idx="2"/>
             <a:endCxn id="14" idx="0"/>
           </p:cNvCxnSpPr>
           <p:nvPr/>
         </p:nvCxnSpPr>
         <p:spPr>
           <a:xfrm rot="5400000">
-            <a:off x="2406456" y="5029221"/>
-            <a:ext cx="537754" cy="1171213"/>
+            <a:off x="2462369" y="5555255"/>
+            <a:ext cx="383326" cy="1135358"/>
           </a:xfrm>
           <a:prstGeom prst="straightConnector1">
             <a:avLst/>
           </a:prstGeom>
           <a:ln>
             <a:solidFill>
-              <a:schemeClr val="tx1"/>
+              <a:schemeClr val="tx1">
+                <a:lumMod val="75000"/>
+              </a:schemeClr>
             </a:solidFill>
             <a:tailEnd type="arrow"/>
           </a:ln>
@@ -5290,8 +5291,8 @@
         </p:nvSpPr>
         <p:spPr>
           <a:xfrm>
-            <a:off x="6362727" y="2883938"/>
-            <a:ext cx="2716478" cy="2709004"/>
+            <a:off x="6325647" y="2328568"/>
+            <a:ext cx="2675730" cy="1066874"/>
           </a:xfrm>
           <a:prstGeom prst="bracketPair">
             <a:avLst/>
@@ -5369,19 +5370,619 @@
       <p:cxnSp>
         <p:nvCxnSpPr>
           <p:cNvPr id="33" name="Elbow Connector 32"/>
-          <p:cNvCxnSpPr>
-            <a:stCxn id="29" idx="1"/>
-          </p:cNvCxnSpPr>
+          <p:cNvCxnSpPr/>
           <p:nvPr/>
         </p:nvCxnSpPr>
         <p:spPr>
-          <a:xfrm rot="10800000" flipV="1">
-            <a:off x="3641403" y="4238439"/>
-            <a:ext cx="2721325" cy="413469"/>
+          <a:xfrm rot="10800000">
+            <a:off x="3797094" y="3022371"/>
+            <a:ext cx="2528553" cy="1588"/>
           </a:xfrm>
           <a:prstGeom prst="bentConnector3">
             <a:avLst>
-              <a:gd name="adj1" fmla="val 3809"/>
+              <a:gd name="adj1" fmla="val 50000"/>
+            </a:avLst>
+          </a:prstGeom>
+          <a:ln w="25400" cap="flat" cmpd="sng" algn="ctr">
+            <a:solidFill>
+              <a:schemeClr val="tx1"/>
+            </a:solidFill>
+            <a:prstDash val="sysDash"/>
+            <a:round/>
+            <a:headEnd type="none" w="med" len="med"/>
+            <a:tailEnd type="none" w="med" len="med"/>
+          </a:ln>
+        </p:spPr>
+        <p:style>
+          <a:lnRef idx="2">
+            <a:schemeClr val="accent1"/>
+          </a:lnRef>
+          <a:fillRef idx="0">
+            <a:schemeClr val="accent1"/>
+          </a:fillRef>
+          <a:effectRef idx="1">
+            <a:schemeClr val="accent1"/>
+          </a:effectRef>
+          <a:fontRef idx="minor">
+            <a:schemeClr val="tx1"/>
+          </a:fontRef>
+        </p:style>
+      </p:cxnSp>
+      <p:sp>
+        <p:nvSpPr>
+          <p:cNvPr id="39" name="Rounded Rectangle 38"/>
+          <p:cNvSpPr/>
+          <p:nvPr/>
+        </p:nvSpPr>
+        <p:spPr>
+          <a:xfrm>
+            <a:off x="1709060" y="3648182"/>
+            <a:ext cx="2974170" cy="321774"/>
+          </a:xfrm>
+          <a:prstGeom prst="roundRect">
+            <a:avLst/>
+          </a:prstGeom>
+        </p:spPr>
+        <p:style>
+          <a:lnRef idx="1">
+            <a:schemeClr val="accent1"/>
+          </a:lnRef>
+          <a:fillRef idx="3">
+            <a:schemeClr val="accent1"/>
+          </a:fillRef>
+          <a:effectRef idx="2">
+            <a:schemeClr val="accent1"/>
+          </a:effectRef>
+          <a:fontRef idx="minor">
+            <a:schemeClr val="lt1"/>
+          </a:fontRef>
+        </p:style>
+        <p:txBody>
+          <a:bodyPr rtlCol="0" anchor="ctr"/>
+          <a:lstStyle/>
+          <a:p>
+            <a:pPr algn="ctr"/>
+            <a:r>
+              <a:rPr lang="en-US" dirty="0" smtClean="0"/>
+              <a:t>Working table </a:t>
+            </a:r>
+            <a:r>
+              <a:rPr lang="en-US" dirty="0" smtClean="0"/>
+              <a:t>creation</a:t>
+            </a:r>
+            <a:endParaRPr lang="en-US" dirty="0" smtClean="0"/>
+          </a:p>
+        </p:txBody>
+      </p:sp>
+      <p:cxnSp>
+        <p:nvCxnSpPr>
+          <p:cNvPr id="65" name="Straight Arrow Connector 64"/>
+          <p:cNvCxnSpPr>
+            <a:stCxn id="39" idx="2"/>
+            <a:endCxn id="72" idx="1"/>
+          </p:cNvCxnSpPr>
+          <p:nvPr/>
+        </p:nvCxnSpPr>
+        <p:spPr>
+          <a:xfrm rot="5400000">
+            <a:off x="3030431" y="4135668"/>
+            <a:ext cx="331427" cy="2"/>
+          </a:xfrm>
+          <a:prstGeom prst="straightConnector1">
+            <a:avLst/>
+          </a:prstGeom>
+          <a:ln>
+            <a:solidFill>
+              <a:srgbClr val="BFBFBF"/>
+            </a:solidFill>
+            <a:tailEnd type="arrow"/>
+          </a:ln>
+        </p:spPr>
+        <p:style>
+          <a:lnRef idx="2">
+            <a:schemeClr val="accent1"/>
+          </a:lnRef>
+          <a:fillRef idx="0">
+            <a:schemeClr val="accent1"/>
+          </a:fillRef>
+          <a:effectRef idx="1">
+            <a:schemeClr val="accent1"/>
+          </a:effectRef>
+          <a:fontRef idx="minor">
+            <a:schemeClr val="tx1"/>
+          </a:fontRef>
+        </p:style>
+      </p:cxnSp>
+      <p:sp>
+        <p:nvSpPr>
+          <p:cNvPr id="72" name="Can 71"/>
+          <p:cNvSpPr/>
+          <p:nvPr/>
+        </p:nvSpPr>
+        <p:spPr>
+          <a:xfrm>
+            <a:off x="1836439" y="4301383"/>
+            <a:ext cx="2719408" cy="618044"/>
+          </a:xfrm>
+          <a:prstGeom prst="can">
+            <a:avLst/>
+          </a:prstGeom>
+          <a:ln>
+            <a:solidFill>
+              <a:srgbClr val="BFBFBF"/>
+            </a:solidFill>
+          </a:ln>
+        </p:spPr>
+        <p:style>
+          <a:lnRef idx="1">
+            <a:schemeClr val="accent1"/>
+          </a:lnRef>
+          <a:fillRef idx="3">
+            <a:schemeClr val="accent1"/>
+          </a:fillRef>
+          <a:effectRef idx="2">
+            <a:schemeClr val="accent1"/>
+          </a:effectRef>
+          <a:fontRef idx="minor">
+            <a:schemeClr val="lt1"/>
+          </a:fontRef>
+        </p:style>
+        <p:txBody>
+          <a:bodyPr rtlCol="0" anchor="ctr"/>
+          <a:lstStyle/>
+          <a:p>
+            <a:pPr algn="ctr"/>
+            <a:r>
+              <a:rPr lang="en-US" dirty="0" smtClean="0"/>
+              <a:t>Primary working </a:t>
+            </a:r>
+            <a:r>
+              <a:rPr lang="en-US" dirty="0" smtClean="0"/>
+              <a:t>tables</a:t>
+            </a:r>
+            <a:endParaRPr lang="en-US" dirty="0"/>
+          </a:p>
+        </p:txBody>
+      </p:sp>
+      <p:sp>
+        <p:nvSpPr>
+          <p:cNvPr id="95" name="Rounded Rectangle 94"/>
+          <p:cNvSpPr/>
+          <p:nvPr/>
+        </p:nvSpPr>
+        <p:spPr>
+          <a:xfrm>
+            <a:off x="1272384" y="5106966"/>
+            <a:ext cx="3898653" cy="824305"/>
+          </a:xfrm>
+          <a:prstGeom prst="roundRect">
+            <a:avLst/>
+          </a:prstGeom>
+        </p:spPr>
+        <p:style>
+          <a:lnRef idx="1">
+            <a:schemeClr val="accent1"/>
+          </a:lnRef>
+          <a:fillRef idx="3">
+            <a:schemeClr val="accent1"/>
+          </a:fillRef>
+          <a:effectRef idx="2">
+            <a:schemeClr val="accent1"/>
+          </a:effectRef>
+          <a:fontRef idx="minor">
+            <a:schemeClr val="lt1"/>
+          </a:fontRef>
+        </p:style>
+        <p:txBody>
+          <a:bodyPr rtlCol="0" anchor="ctr"/>
+          <a:lstStyle/>
+          <a:p>
+            <a:pPr algn="ctr"/>
+            <a:r>
+              <a:rPr lang="en-US" dirty="0" smtClean="0"/>
+              <a:t>Data work up scripts: </a:t>
+            </a:r>
+          </a:p>
+          <a:p>
+            <a:pPr algn="ctr"/>
+            <a:r>
+              <a:rPr lang="en-US" dirty="0" smtClean="0"/>
+              <a:t>Build and format tables for endpoints (R, SQL)</a:t>
+            </a:r>
+            <a:endParaRPr lang="en-US" dirty="0"/>
+          </a:p>
+        </p:txBody>
+      </p:sp>
+      <p:cxnSp>
+        <p:nvCxnSpPr>
+          <p:cNvPr id="117" name="Straight Arrow Connector 116"/>
+          <p:cNvCxnSpPr>
+            <a:stCxn id="72" idx="3"/>
+            <a:endCxn id="95" idx="0"/>
+          </p:cNvCxnSpPr>
+          <p:nvPr/>
+        </p:nvCxnSpPr>
+        <p:spPr>
+          <a:xfrm rot="16200000" flipH="1">
+            <a:off x="3115158" y="5000412"/>
+            <a:ext cx="187539" cy="25568"/>
+          </a:xfrm>
+          <a:prstGeom prst="straightConnector1">
+            <a:avLst/>
+          </a:prstGeom>
+          <a:ln>
+            <a:solidFill>
+              <a:srgbClr val="BFBFBF"/>
+            </a:solidFill>
+            <a:tailEnd type="arrow"/>
+          </a:ln>
+        </p:spPr>
+        <p:style>
+          <a:lnRef idx="2">
+            <a:schemeClr val="accent1"/>
+          </a:lnRef>
+          <a:fillRef idx="0">
+            <a:schemeClr val="accent1"/>
+          </a:fillRef>
+          <a:effectRef idx="1">
+            <a:schemeClr val="accent1"/>
+          </a:effectRef>
+          <a:fontRef idx="minor">
+            <a:schemeClr val="tx1"/>
+          </a:fontRef>
+        </p:style>
+      </p:cxnSp>
+      <p:sp>
+        <p:nvSpPr>
+          <p:cNvPr id="120" name="Double Bracket 119"/>
+          <p:cNvSpPr/>
+          <p:nvPr/>
+        </p:nvSpPr>
+        <p:spPr>
+          <a:xfrm>
+            <a:off x="6152286" y="1168489"/>
+            <a:ext cx="2929722" cy="965230"/>
+          </a:xfrm>
+          <a:prstGeom prst="bracketPair">
+            <a:avLst/>
+          </a:prstGeom>
+          <a:ln w="25400" cap="flat" cmpd="sng" algn="ctr">
+            <a:solidFill>
+              <a:schemeClr val="tx1"/>
+            </a:solidFill>
+            <a:prstDash val="sysDash"/>
+            <a:round/>
+            <a:headEnd type="none" w="med" len="med"/>
+            <a:tailEnd type="none" w="med" len="med"/>
+          </a:ln>
+        </p:spPr>
+        <p:style>
+          <a:lnRef idx="2">
+            <a:schemeClr val="accent1"/>
+          </a:lnRef>
+          <a:fillRef idx="0">
+            <a:schemeClr val="accent1"/>
+          </a:fillRef>
+          <a:effectRef idx="1">
+            <a:schemeClr val="accent1"/>
+          </a:effectRef>
+          <a:fontRef idx="minor">
+            <a:schemeClr val="tx1"/>
+          </a:fontRef>
+        </p:style>
+        <p:txBody>
+          <a:bodyPr rtlCol="0" anchor="ctr"/>
+          <a:lstStyle/>
+          <a:p>
+            <a:pPr>
+              <a:buFont typeface="Arial"/>
+              <a:buChar char="•"/>
+            </a:pPr>
+            <a:r>
+              <a:rPr lang="en-US" dirty="0" smtClean="0"/>
+              <a:t>conversion </a:t>
+            </a:r>
+            <a:r>
+              <a:rPr lang="en-US" dirty="0" smtClean="0"/>
+              <a:t>to .</a:t>
+            </a:r>
+            <a:r>
+              <a:rPr lang="en-US" dirty="0" err="1" smtClean="0"/>
+              <a:t>csv</a:t>
+            </a:r>
+            <a:endParaRPr lang="en-US" dirty="0" smtClean="0"/>
+          </a:p>
+          <a:p>
+            <a:pPr>
+              <a:buFont typeface="Arial"/>
+              <a:buChar char="•"/>
+            </a:pPr>
+            <a:r>
+              <a:rPr lang="en-US" dirty="0" smtClean="0"/>
+              <a:t>special character treatment</a:t>
+            </a:r>
+          </a:p>
+          <a:p>
+            <a:pPr>
+              <a:buFont typeface="Arial"/>
+              <a:buChar char="•"/>
+            </a:pPr>
+            <a:r>
+              <a:rPr lang="en-US" dirty="0" smtClean="0"/>
+              <a:t>reformatting</a:t>
+            </a:r>
+            <a:r>
+              <a:rPr lang="en-US" dirty="0" smtClean="0"/>
+              <a:t>/</a:t>
+            </a:r>
+            <a:r>
+              <a:rPr lang="en-US" dirty="0" smtClean="0"/>
+              <a:t>restructuring</a:t>
+            </a:r>
+            <a:endParaRPr lang="en-US" dirty="0" smtClean="0"/>
+          </a:p>
+        </p:txBody>
+      </p:sp>
+      <p:cxnSp>
+        <p:nvCxnSpPr>
+          <p:cNvPr id="121" name="Elbow Connector 120"/>
+          <p:cNvCxnSpPr>
+            <a:stCxn id="120" idx="1"/>
+            <a:endCxn id="6" idx="3"/>
+          </p:cNvCxnSpPr>
+          <p:nvPr/>
+        </p:nvCxnSpPr>
+        <p:spPr>
+          <a:xfrm rot="10800000" flipV="1">
+            <a:off x="5264614" y="1651104"/>
+            <a:ext cx="887673" cy="363860"/>
+          </a:xfrm>
+          <a:prstGeom prst="bentConnector3">
+            <a:avLst>
+              <a:gd name="adj1" fmla="val 50000"/>
+            </a:avLst>
+          </a:prstGeom>
+          <a:ln w="25400" cap="flat" cmpd="sng" algn="ctr">
+            <a:solidFill>
+              <a:schemeClr val="tx1"/>
+            </a:solidFill>
+            <a:prstDash val="sysDash"/>
+            <a:round/>
+            <a:headEnd type="none" w="med" len="med"/>
+            <a:tailEnd type="none" w="med" len="med"/>
+          </a:ln>
+        </p:spPr>
+        <p:style>
+          <a:lnRef idx="2">
+            <a:schemeClr val="accent1"/>
+          </a:lnRef>
+          <a:fillRef idx="0">
+            <a:schemeClr val="accent1"/>
+          </a:fillRef>
+          <a:effectRef idx="1">
+            <a:schemeClr val="accent1"/>
+          </a:effectRef>
+          <a:fontRef idx="minor">
+            <a:schemeClr val="tx1"/>
+          </a:fontRef>
+        </p:style>
+      </p:cxnSp>
+      <p:sp>
+        <p:nvSpPr>
+          <p:cNvPr id="133" name="Double Bracket 132"/>
+          <p:cNvSpPr/>
+          <p:nvPr/>
+        </p:nvSpPr>
+        <p:spPr>
+          <a:xfrm>
+            <a:off x="5967760" y="4747311"/>
+            <a:ext cx="2675730" cy="1066874"/>
+          </a:xfrm>
+          <a:prstGeom prst="bracketPair">
+            <a:avLst/>
+          </a:prstGeom>
+          <a:ln w="25400" cap="flat" cmpd="sng" algn="ctr">
+            <a:solidFill>
+              <a:schemeClr val="tx1"/>
+            </a:solidFill>
+            <a:prstDash val="sysDash"/>
+            <a:round/>
+            <a:headEnd type="none" w="med" len="med"/>
+            <a:tailEnd type="none" w="med" len="med"/>
+          </a:ln>
+        </p:spPr>
+        <p:style>
+          <a:lnRef idx="2">
+            <a:schemeClr val="accent1"/>
+          </a:lnRef>
+          <a:fillRef idx="0">
+            <a:schemeClr val="accent1"/>
+          </a:fillRef>
+          <a:effectRef idx="1">
+            <a:schemeClr val="accent1"/>
+          </a:effectRef>
+          <a:fontRef idx="minor">
+            <a:schemeClr val="tx1"/>
+          </a:fontRef>
+        </p:style>
+        <p:txBody>
+          <a:bodyPr rtlCol="0" anchor="ctr"/>
+          <a:lstStyle/>
+          <a:p>
+            <a:r>
+              <a:rPr lang="en-US" u="sng" dirty="0" smtClean="0"/>
+              <a:t>Clean, reliable data</a:t>
+            </a:r>
+          </a:p>
+          <a:p>
+            <a:pPr>
+              <a:buFont typeface="Arial"/>
+              <a:buChar char="•"/>
+            </a:pPr>
+            <a:r>
+              <a:rPr lang="en-US" dirty="0" smtClean="0"/>
+              <a:t>transactions</a:t>
+            </a:r>
+          </a:p>
+          <a:p>
+            <a:pPr>
+              <a:buFont typeface="Arial"/>
+              <a:buChar char="•"/>
+            </a:pPr>
+            <a:r>
+              <a:rPr lang="en-US" dirty="0" smtClean="0"/>
+              <a:t>committees</a:t>
+            </a:r>
+            <a:endParaRPr lang="en-US" dirty="0" smtClean="0"/>
+          </a:p>
+          <a:p>
+            <a:pPr>
+              <a:buFont typeface="Arial"/>
+              <a:buChar char="•"/>
+            </a:pPr>
+            <a:r>
+              <a:rPr lang="en-US" dirty="0" smtClean="0"/>
+              <a:t>candidate filings</a:t>
+            </a:r>
+            <a:endParaRPr lang="en-US" dirty="0" smtClean="0"/>
+          </a:p>
+        </p:txBody>
+      </p:sp>
+      <p:cxnSp>
+        <p:nvCxnSpPr>
+          <p:cNvPr id="136" name="Elbow Connector 135"/>
+          <p:cNvCxnSpPr>
+            <a:stCxn id="133" idx="1"/>
+            <a:endCxn id="72" idx="4"/>
+          </p:cNvCxnSpPr>
+          <p:nvPr/>
+        </p:nvCxnSpPr>
+        <p:spPr>
+          <a:xfrm rot="10800000">
+            <a:off x="4555848" y="4610406"/>
+            <a:ext cx="1411913" cy="670343"/>
+          </a:xfrm>
+          <a:prstGeom prst="bentConnector3">
+            <a:avLst>
+              <a:gd name="adj1" fmla="val 50000"/>
+            </a:avLst>
+          </a:prstGeom>
+          <a:ln w="25400" cap="flat" cmpd="sng" algn="ctr">
+            <a:solidFill>
+              <a:schemeClr val="tx1"/>
+            </a:solidFill>
+            <a:prstDash val="sysDash"/>
+            <a:round/>
+            <a:headEnd type="none" w="med" len="med"/>
+            <a:tailEnd type="none" w="med" len="med"/>
+          </a:ln>
+        </p:spPr>
+        <p:style>
+          <a:lnRef idx="2">
+            <a:schemeClr val="accent1"/>
+          </a:lnRef>
+          <a:fillRef idx="0">
+            <a:schemeClr val="accent1"/>
+          </a:fillRef>
+          <a:effectRef idx="1">
+            <a:schemeClr val="accent1"/>
+          </a:effectRef>
+          <a:fontRef idx="minor">
+            <a:schemeClr val="tx1"/>
+          </a:fontRef>
+        </p:style>
+      </p:cxnSp>
+      <p:sp>
+        <p:nvSpPr>
+          <p:cNvPr id="141" name="Double Bracket 140"/>
+          <p:cNvSpPr/>
+          <p:nvPr/>
+        </p:nvSpPr>
+        <p:spPr>
+          <a:xfrm>
+            <a:off x="5171037" y="3451704"/>
+            <a:ext cx="3910972" cy="1065125"/>
+          </a:xfrm>
+          <a:prstGeom prst="bracketPair">
+            <a:avLst/>
+          </a:prstGeom>
+          <a:ln w="25400" cap="flat" cmpd="sng" algn="ctr">
+            <a:solidFill>
+              <a:schemeClr val="tx1"/>
+            </a:solidFill>
+            <a:prstDash val="sysDash"/>
+            <a:round/>
+            <a:headEnd type="none" w="med" len="med"/>
+            <a:tailEnd type="none" w="med" len="med"/>
+          </a:ln>
+        </p:spPr>
+        <p:style>
+          <a:lnRef idx="2">
+            <a:schemeClr val="accent1"/>
+          </a:lnRef>
+          <a:fillRef idx="0">
+            <a:schemeClr val="accent1"/>
+          </a:fillRef>
+          <a:effectRef idx="1">
+            <a:schemeClr val="accent1"/>
+          </a:effectRef>
+          <a:fontRef idx="minor">
+            <a:schemeClr val="tx1"/>
+          </a:fontRef>
+        </p:style>
+        <p:txBody>
+          <a:bodyPr rtlCol="0" anchor="ctr"/>
+          <a:lstStyle/>
+          <a:p>
+            <a:pPr>
+              <a:buFont typeface="Arial"/>
+              <a:buChar char="•"/>
+            </a:pPr>
+            <a:r>
+              <a:rPr lang="en-US" dirty="0" smtClean="0"/>
+              <a:t>Handling amended transactions</a:t>
+            </a:r>
+          </a:p>
+          <a:p>
+            <a:pPr>
+              <a:buFont typeface="Arial"/>
+              <a:buChar char="•"/>
+            </a:pPr>
+            <a:r>
+              <a:rPr lang="en-US" dirty="0" smtClean="0"/>
+              <a:t>Spelling and typos</a:t>
+            </a:r>
+          </a:p>
+          <a:p>
+            <a:pPr>
+              <a:buFont typeface="Arial"/>
+              <a:buChar char="•"/>
+            </a:pPr>
+            <a:r>
+              <a:rPr lang="en-US" dirty="0" smtClean="0"/>
+              <a:t>Normalizing names, addresses, etc..</a:t>
+            </a:r>
+            <a:endParaRPr lang="en-US" dirty="0" smtClean="0"/>
+          </a:p>
+        </p:txBody>
+      </p:sp>
+      <p:cxnSp>
+        <p:nvCxnSpPr>
+          <p:cNvPr id="142" name="Elbow Connector 141"/>
+          <p:cNvCxnSpPr>
+            <a:stCxn id="141" idx="1"/>
+            <a:endCxn id="39" idx="3"/>
+          </p:cNvCxnSpPr>
+          <p:nvPr/>
+        </p:nvCxnSpPr>
+        <p:spPr>
+          <a:xfrm rot="10800000">
+            <a:off x="4683231" y="3809069"/>
+            <a:ext cx="487807" cy="175198"/>
+          </a:xfrm>
+          <a:prstGeom prst="bentConnector3">
+            <a:avLst>
+              <a:gd name="adj1" fmla="val 50000"/>
             </a:avLst>
           </a:prstGeom>
           <a:ln w="25400" cap="flat" cmpd="sng" algn="ctr">
@@ -7557,8 +8158,8 @@
         </p:nvSpPr>
         <p:spPr>
           <a:xfrm>
-            <a:off x="457200" y="3615271"/>
-            <a:ext cx="2004958" cy="914400"/>
+            <a:off x="457199" y="3615271"/>
+            <a:ext cx="2419637" cy="738603"/>
           </a:xfrm>
           <a:prstGeom prst="rect">
             <a:avLst/>
@@ -7584,8 +8185,8 @@
           <a:p>
             <a:pPr algn="ctr"/>
             <a:r>
-              <a:rPr lang="en-US" dirty="0" smtClean="0"/>
-              <a:t>transactions</a:t>
+              <a:rPr lang="en-US" dirty="0" err="1" smtClean="0"/>
+              <a:t>working_transactions</a:t>
             </a:r>
             <a:endParaRPr lang="en-US" dirty="0"/>
           </a:p>
@@ -7670,6 +8271,48 @@
             <a:r>
               <a:rPr lang="en-US" dirty="0" err="1" smtClean="0"/>
               <a:t>campaign_detail</a:t>
+            </a:r>
+            <a:endParaRPr lang="en-US" dirty="0"/>
+          </a:p>
+        </p:txBody>
+      </p:sp>
+      <p:sp>
+        <p:nvSpPr>
+          <p:cNvPr id="9" name="Rectangle 8"/>
+          <p:cNvSpPr/>
+          <p:nvPr/>
+        </p:nvSpPr>
+        <p:spPr>
+          <a:xfrm>
+            <a:off x="5097974" y="4936984"/>
+            <a:ext cx="2819807" cy="531276"/>
+          </a:xfrm>
+          <a:prstGeom prst="rect">
+            <a:avLst/>
+          </a:prstGeom>
+        </p:spPr>
+        <p:style>
+          <a:lnRef idx="1">
+            <a:schemeClr val="accent1"/>
+          </a:lnRef>
+          <a:fillRef idx="3">
+            <a:schemeClr val="accent1"/>
+          </a:fillRef>
+          <a:effectRef idx="2">
+            <a:schemeClr val="accent1"/>
+          </a:effectRef>
+          <a:fontRef idx="minor">
+            <a:schemeClr val="lt1"/>
+          </a:fontRef>
+        </p:style>
+        <p:txBody>
+          <a:bodyPr rtlCol="0" anchor="ctr"/>
+          <a:lstStyle/>
+          <a:p>
+            <a:pPr algn="ctr"/>
+            <a:r>
+              <a:rPr lang="en-US" dirty="0" err="1" smtClean="0"/>
+              <a:t>cc_working_transactions</a:t>
             </a:r>
             <a:endParaRPr lang="en-US" dirty="0"/>
           </a:p>

</xml_diff>

<commit_message>
committees in search results, grassroots updates
</commit_message>
<xml_diff>
--- a/infrastructure.pptx
+++ b/infrastructure.pptx
@@ -300,7 +300,7 @@
             <a:fld id="{7C061FE0-E704-BF41-9DC4-C765A7BE7CEB}" type="datetimeFigureOut">
               <a:rPr lang="en-US" smtClean="0"/>
               <a:pPr/>
-              <a:t>10/2/14</a:t>
+              <a:t>10/17/14</a:t>
             </a:fld>
             <a:endParaRPr lang="en-US"/>
           </a:p>
@@ -467,7 +467,7 @@
             <a:fld id="{7C061FE0-E704-BF41-9DC4-C765A7BE7CEB}" type="datetimeFigureOut">
               <a:rPr lang="en-US" smtClean="0"/>
               <a:pPr/>
-              <a:t>10/2/14</a:t>
+              <a:t>10/17/14</a:t>
             </a:fld>
             <a:endParaRPr lang="en-US"/>
           </a:p>
@@ -644,7 +644,7 @@
             <a:fld id="{7C061FE0-E704-BF41-9DC4-C765A7BE7CEB}" type="datetimeFigureOut">
               <a:rPr lang="en-US" smtClean="0"/>
               <a:pPr/>
-              <a:t>10/2/14</a:t>
+              <a:t>10/17/14</a:t>
             </a:fld>
             <a:endParaRPr lang="en-US"/>
           </a:p>
@@ -811,7 +811,7 @@
             <a:fld id="{7C061FE0-E704-BF41-9DC4-C765A7BE7CEB}" type="datetimeFigureOut">
               <a:rPr lang="en-US" smtClean="0"/>
               <a:pPr/>
-              <a:t>10/2/14</a:t>
+              <a:t>10/17/14</a:t>
             </a:fld>
             <a:endParaRPr lang="en-US"/>
           </a:p>
@@ -1054,7 +1054,7 @@
             <a:fld id="{7C061FE0-E704-BF41-9DC4-C765A7BE7CEB}" type="datetimeFigureOut">
               <a:rPr lang="en-US" smtClean="0"/>
               <a:pPr/>
-              <a:t>10/2/14</a:t>
+              <a:t>10/17/14</a:t>
             </a:fld>
             <a:endParaRPr lang="en-US"/>
           </a:p>
@@ -1339,7 +1339,7 @@
             <a:fld id="{7C061FE0-E704-BF41-9DC4-C765A7BE7CEB}" type="datetimeFigureOut">
               <a:rPr lang="en-US" smtClean="0"/>
               <a:pPr/>
-              <a:t>10/2/14</a:t>
+              <a:t>10/17/14</a:t>
             </a:fld>
             <a:endParaRPr lang="en-US"/>
           </a:p>
@@ -1758,7 +1758,7 @@
             <a:fld id="{7C061FE0-E704-BF41-9DC4-C765A7BE7CEB}" type="datetimeFigureOut">
               <a:rPr lang="en-US" smtClean="0"/>
               <a:pPr/>
-              <a:t>10/2/14</a:t>
+              <a:t>10/17/14</a:t>
             </a:fld>
             <a:endParaRPr lang="en-US"/>
           </a:p>
@@ -1873,7 +1873,7 @@
             <a:fld id="{7C061FE0-E704-BF41-9DC4-C765A7BE7CEB}" type="datetimeFigureOut">
               <a:rPr lang="en-US" smtClean="0"/>
               <a:pPr/>
-              <a:t>10/2/14</a:t>
+              <a:t>10/17/14</a:t>
             </a:fld>
             <a:endParaRPr lang="en-US"/>
           </a:p>
@@ -1965,7 +1965,7 @@
             <a:fld id="{7C061FE0-E704-BF41-9DC4-C765A7BE7CEB}" type="datetimeFigureOut">
               <a:rPr lang="en-US" smtClean="0"/>
               <a:pPr/>
-              <a:t>10/2/14</a:t>
+              <a:t>10/17/14</a:t>
             </a:fld>
             <a:endParaRPr lang="en-US"/>
           </a:p>
@@ -2239,7 +2239,7 @@
             <a:fld id="{7C061FE0-E704-BF41-9DC4-C765A7BE7CEB}" type="datetimeFigureOut">
               <a:rPr lang="en-US" smtClean="0"/>
               <a:pPr/>
-              <a:t>10/2/14</a:t>
+              <a:t>10/17/14</a:t>
             </a:fld>
             <a:endParaRPr lang="en-US"/>
           </a:p>
@@ -2489,7 +2489,7 @@
             <a:fld id="{7C061FE0-E704-BF41-9DC4-C765A7BE7CEB}" type="datetimeFigureOut">
               <a:rPr lang="en-US" smtClean="0"/>
               <a:pPr/>
-              <a:t>10/2/14</a:t>
+              <a:t>10/17/14</a:t>
             </a:fld>
             <a:endParaRPr lang="en-US"/>
           </a:p>
@@ -2699,7 +2699,7 @@
             <a:fld id="{7C061FE0-E704-BF41-9DC4-C765A7BE7CEB}" type="datetimeFigureOut">
               <a:rPr lang="en-US" smtClean="0"/>
               <a:pPr/>
-              <a:t>10/2/14</a:t>
+              <a:t>10/17/14</a:t>
             </a:fld>
             <a:endParaRPr lang="en-US"/>
           </a:p>
@@ -7287,11 +7287,7 @@
             <a:pPr algn="ctr"/>
             <a:r>
               <a:rPr lang="en-US" sz="1400" dirty="0" smtClean="0"/>
-              <a:t>Build and format tables for endpoints (R, SQL</a:t>
-            </a:r>
-            <a:r>
-              <a:rPr lang="en-US" sz="1400" dirty="0" smtClean="0"/>
-              <a:t>)</a:t>
+              <a:t>Build and format tables for endpoints (R, SQL)</a:t>
             </a:r>
           </a:p>
           <a:p>
@@ -8858,12 +8854,18 @@
         </p:nvSpPr>
         <p:spPr>
           <a:xfrm>
-            <a:off x="464203" y="2252231"/>
+            <a:off x="464203" y="2357483"/>
             <a:ext cx="3190418" cy="621978"/>
           </a:xfrm>
           <a:prstGeom prst="rect">
             <a:avLst/>
           </a:prstGeom>
+          <a:solidFill>
+            <a:schemeClr val="accent6">
+              <a:lumMod val="60000"/>
+              <a:lumOff val="40000"/>
+            </a:schemeClr>
+          </a:solidFill>
           <a:ln>
             <a:solidFill>
               <a:schemeClr val="tx1">
@@ -8906,12 +8908,18 @@
         </p:nvSpPr>
         <p:spPr>
           <a:xfrm>
-            <a:off x="389027" y="945465"/>
+            <a:off x="389026" y="669661"/>
             <a:ext cx="3265594" cy="554784"/>
           </a:xfrm>
           <a:prstGeom prst="rect">
             <a:avLst/>
           </a:prstGeom>
+          <a:solidFill>
+            <a:schemeClr val="accent6">
+              <a:lumMod val="60000"/>
+              <a:lumOff val="40000"/>
+            </a:schemeClr>
+          </a:solidFill>
           <a:ln>
             <a:solidFill>
               <a:schemeClr val="tx1">
@@ -8962,12 +8970,18 @@
         </p:nvSpPr>
         <p:spPr>
           <a:xfrm>
-            <a:off x="464203" y="1717834"/>
-            <a:ext cx="2725281" cy="391036"/>
+            <a:off x="464203" y="1541997"/>
+            <a:ext cx="2723643" cy="485491"/>
           </a:xfrm>
           <a:prstGeom prst="rect">
             <a:avLst/>
           </a:prstGeom>
+          <a:solidFill>
+            <a:schemeClr val="accent6">
+              <a:lumMod val="60000"/>
+              <a:lumOff val="40000"/>
+            </a:schemeClr>
+          </a:solidFill>
           <a:ln>
             <a:solidFill>
               <a:schemeClr val="tx1">
@@ -8991,15 +9005,17 @@
           </a:fontRef>
         </p:style>
         <p:txBody>
-          <a:bodyPr rtlCol="0" anchor="ctr"/>
-          <a:lstStyle/>
-          <a:p>
-            <a:pPr algn="ctr"/>
+          <a:bodyPr rtlCol="0" anchor="t"/>
+          <a:lstStyle/>
+          <a:p>
             <a:r>
               <a:rPr lang="en-US" dirty="0" smtClean="0"/>
-              <a:t>Import new set of records</a:t>
-            </a:r>
-            <a:endParaRPr lang="en-US" dirty="0"/>
+              <a:t>Import new set of </a:t>
+            </a:r>
+            <a:r>
+              <a:rPr lang="en-US" dirty="0" smtClean="0"/>
+              <a:t>records:</a:t>
+            </a:r>
           </a:p>
         </p:txBody>
       </p:sp>
@@ -9067,7 +9083,7 @@
         </p:nvGrpSpPr>
         <p:grpSpPr>
           <a:xfrm>
-            <a:off x="5994271" y="4774733"/>
+            <a:off x="5968353" y="5228263"/>
             <a:ext cx="3139870" cy="929729"/>
             <a:chOff x="5058026" y="5449656"/>
             <a:chExt cx="3139870" cy="929729"/>
@@ -9374,12 +9390,18 @@
         </p:nvSpPr>
         <p:spPr>
           <a:xfrm>
-            <a:off x="173790" y="3850878"/>
-            <a:ext cx="3449050" cy="1434331"/>
+            <a:off x="173789" y="3321258"/>
+            <a:ext cx="3960043" cy="2383204"/>
           </a:xfrm>
           <a:prstGeom prst="roundRect">
             <a:avLst/>
           </a:prstGeom>
+          <a:solidFill>
+            <a:schemeClr val="accent6">
+              <a:lumMod val="60000"/>
+              <a:lumOff val="40000"/>
+            </a:schemeClr>
+          </a:solidFill>
         </p:spPr>
         <p:style>
           <a:lnRef idx="1">
@@ -9406,10 +9428,7 @@
             <a:endParaRPr lang="en-US" u="sng" dirty="0" smtClean="0"/>
           </a:p>
           <a:p>
-            <a:pPr marL="342900" indent="-342900">
-              <a:buFont typeface="+mj-lt"/>
-              <a:buAutoNum type="arabicPeriod"/>
-            </a:pPr>
+            <a:pPr marL="342900" indent="-342900"/>
             <a:r>
               <a:rPr lang="en-US" sz="1400" dirty="0" err="1" smtClean="0"/>
               <a:t>workingTableCreation.sh</a:t>
@@ -9417,10 +9436,71 @@
             <a:endParaRPr lang="en-US" sz="1400" dirty="0" smtClean="0"/>
           </a:p>
           <a:p>
-            <a:pPr marL="342900" indent="-342900">
-              <a:buFont typeface="+mj-lt"/>
-              <a:buAutoNum type="arabicPeriod"/>
-            </a:pPr>
+            <a:r>
+              <a:rPr lang="en-US" sz="1100" dirty="0" smtClean="0"/>
+              <a:t>       </a:t>
+            </a:r>
+            <a:r>
+              <a:rPr lang="en-US" sz="1100" b="1" dirty="0" err="1" smtClean="0"/>
+              <a:t>raw_committees_scraped</a:t>
+            </a:r>
+            <a:r>
+              <a:rPr lang="en-US" sz="1100" dirty="0" smtClean="0"/>
+              <a:t> -&gt;</a:t>
+            </a:r>
+            <a:r>
+              <a:rPr lang="en-US" sz="1100" dirty="0" err="1" smtClean="0"/>
+              <a:t>working_committees</a:t>
+            </a:r>
+            <a:endParaRPr lang="en-US" sz="1100" dirty="0" smtClean="0"/>
+          </a:p>
+          <a:p>
+            <a:r>
+              <a:rPr lang="en-US" sz="1100" dirty="0" smtClean="0"/>
+              <a:t>	</a:t>
+            </a:r>
+            <a:r>
+              <a:rPr lang="en-US" sz="1100" dirty="0" err="1" smtClean="0"/>
+              <a:t>scrapeAffiliation.R</a:t>
+            </a:r>
+            <a:r>
+              <a:rPr lang="en-US" sz="1100" dirty="0" smtClean="0"/>
+              <a:t> </a:t>
+            </a:r>
+            <a:r>
+              <a:rPr lang="en-US" sz="1100" dirty="0" smtClean="0"/>
+              <a:t>/</a:t>
+            </a:r>
+            <a:r>
+              <a:rPr lang="en-US" sz="1100" dirty="0" smtClean="0"/>
+              <a:t> 	</a:t>
+            </a:r>
+            <a:r>
+              <a:rPr lang="en-US" sz="1100" dirty="0" err="1" smtClean="0"/>
+              <a:t>updateWorkingCommitteesTableWithScraped</a:t>
+            </a:r>
+            <a:r>
+              <a:rPr lang="en-US" sz="1100" dirty="0" smtClean="0"/>
+              <a:t>()</a:t>
+            </a:r>
+            <a:endParaRPr lang="en-US" sz="1100" dirty="0" smtClean="0"/>
+          </a:p>
+          <a:p>
+            <a:r>
+              <a:rPr lang="en-US" sz="1100" dirty="0" smtClean="0"/>
+              <a:t>       </a:t>
+            </a:r>
+            <a:r>
+              <a:rPr lang="en-US" sz="1100" b="1" dirty="0" err="1" smtClean="0"/>
+              <a:t>raw_committee_transactions</a:t>
+            </a:r>
+            <a:endParaRPr lang="en-US" sz="1100" b="1" dirty="0" smtClean="0"/>
+          </a:p>
+          <a:p>
+            <a:endParaRPr lang="en-US" sz="1400" dirty="0" smtClean="0"/>
+          </a:p>
+          <a:p>
+            <a:pPr marL="342900" indent="-342900"/>
             <a:r>
               <a:rPr lang="en-US" sz="1400" dirty="0" err="1" smtClean="0"/>
               <a:t>buildEndpointTables.sh</a:t>
@@ -9428,10 +9508,7 @@
             <a:endParaRPr lang="en-US" sz="1400" dirty="0" smtClean="0"/>
           </a:p>
           <a:p>
-            <a:pPr marL="342900" indent="-342900">
-              <a:buFont typeface="+mj-lt"/>
-              <a:buAutoNum type="arabicPeriod"/>
-            </a:pPr>
+            <a:pPr marL="342900" indent="-342900"/>
             <a:r>
               <a:rPr lang="en-US" sz="1400" dirty="0" err="1" smtClean="0"/>
               <a:t>install.sql</a:t>
@@ -9439,10 +9516,7 @@
             <a:endParaRPr lang="en-US" sz="1400" dirty="0" smtClean="0"/>
           </a:p>
           <a:p>
-            <a:pPr marL="342900" indent="-342900">
-              <a:buFont typeface="+mj-lt"/>
-              <a:buAutoNum type="arabicPeriod"/>
-            </a:pPr>
+            <a:pPr marL="342900" indent="-342900"/>
             <a:r>
               <a:rPr lang="en-US" sz="1400" dirty="0" err="1" smtClean="0"/>
               <a:t>postSchemaInstallationEndpoints.sh</a:t>
@@ -9459,7 +9533,7 @@
         </p:nvSpPr>
         <p:spPr>
           <a:xfrm>
-            <a:off x="4337879" y="4853168"/>
+            <a:off x="4311961" y="5306698"/>
             <a:ext cx="1267622" cy="432043"/>
           </a:xfrm>
           <a:prstGeom prst="snip2SameRect">
@@ -9551,7 +9625,7 @@
           </a:xfrm>
           <a:prstGeom prst="bentConnector4">
             <a:avLst>
-              <a:gd name="adj1" fmla="val 36464"/>
+              <a:gd name="adj1" fmla="val 12923"/>
               <a:gd name="adj2" fmla="val 226396"/>
             </a:avLst>
           </a:prstGeom>
@@ -9635,8 +9709,8 @@
         </p:nvCxnSpPr>
         <p:spPr>
           <a:xfrm rot="16200000" flipH="1">
-            <a:off x="7134241" y="4312377"/>
-            <a:ext cx="640143" cy="284568"/>
+            <a:off x="6894517" y="4552101"/>
+            <a:ext cx="1093673" cy="258650"/>
           </a:xfrm>
           <a:prstGeom prst="bentConnector3">
             <a:avLst>
@@ -9678,15 +9752,15 @@
         </p:nvCxnSpPr>
         <p:spPr>
           <a:xfrm>
-            <a:off x="3189484" y="1913352"/>
-            <a:ext cx="4998339" cy="1588"/>
+            <a:off x="3187846" y="1784743"/>
+            <a:ext cx="4999977" cy="1588"/>
           </a:xfrm>
           <a:prstGeom prst="line">
             <a:avLst/>
           </a:prstGeom>
           <a:ln>
             <a:solidFill>
-              <a:srgbClr val="FF0000"/>
+              <a:srgbClr val="0000FF"/>
             </a:solidFill>
             <a:tailEnd type="oval"/>
           </a:ln>
@@ -9716,7 +9790,7 @@
         </p:nvCxnSpPr>
         <p:spPr>
           <a:xfrm>
-            <a:off x="3654621" y="1222857"/>
+            <a:off x="3654620" y="947053"/>
             <a:ext cx="2578394" cy="1588"/>
           </a:xfrm>
           <a:prstGeom prst="line">
@@ -9724,7 +9798,7 @@
           </a:prstGeom>
           <a:ln>
             <a:solidFill>
-              <a:srgbClr val="FF0000"/>
+              <a:srgbClr val="0000FF"/>
             </a:solidFill>
             <a:tailEnd type="oval"/>
           </a:ln>
@@ -9754,7 +9828,7 @@
         </p:nvCxnSpPr>
         <p:spPr>
           <a:xfrm flipV="1">
-            <a:off x="3654621" y="2252232"/>
+            <a:off x="3654621" y="2357484"/>
             <a:ext cx="4533202" cy="310988"/>
           </a:xfrm>
           <a:prstGeom prst="bentConnector3">
@@ -9764,7 +9838,7 @@
           </a:prstGeom>
           <a:ln>
             <a:solidFill>
-              <a:srgbClr val="FF0000"/>
+              <a:srgbClr val="0000FF"/>
             </a:solidFill>
             <a:tailEnd type="oval"/>
           </a:ln>
@@ -9794,7 +9868,7 @@
         </p:nvCxnSpPr>
         <p:spPr>
           <a:xfrm>
-            <a:off x="3654621" y="2563220"/>
+            <a:off x="3654621" y="2668472"/>
             <a:ext cx="2578394" cy="1588"/>
           </a:xfrm>
           <a:prstGeom prst="bentConnector3">
@@ -9804,7 +9878,7 @@
           </a:prstGeom>
           <a:ln>
             <a:solidFill>
-              <a:srgbClr val="FF0000"/>
+              <a:srgbClr val="0000FF"/>
             </a:solidFill>
             <a:tailEnd type="oval"/>
           </a:ln>
@@ -9832,17 +9906,17 @@
         </p:nvCxnSpPr>
         <p:spPr>
           <a:xfrm flipV="1">
-            <a:off x="2646947" y="3582737"/>
-            <a:ext cx="4665082" cy="802104"/>
+            <a:off x="2646947" y="3647527"/>
+            <a:ext cx="4665082" cy="242830"/>
           </a:xfrm>
           <a:prstGeom prst="bentConnector3">
             <a:avLst>
-              <a:gd name="adj1" fmla="val 42263"/>
+              <a:gd name="adj1" fmla="val 50000"/>
             </a:avLst>
           </a:prstGeom>
           <a:ln>
             <a:solidFill>
-              <a:srgbClr val="FF0000"/>
+              <a:srgbClr val="0000FF"/>
             </a:solidFill>
             <a:tailEnd type="oval"/>
           </a:ln>
@@ -9870,8 +9944,8 @@
         </p:nvCxnSpPr>
         <p:spPr>
           <a:xfrm flipV="1">
-            <a:off x="2473158" y="4424945"/>
-            <a:ext cx="4838871" cy="182330"/>
+            <a:off x="2215942" y="4424945"/>
+            <a:ext cx="5096087" cy="550911"/>
           </a:xfrm>
           <a:prstGeom prst="bentConnector3">
             <a:avLst>
@@ -9880,7 +9954,7 @@
           </a:prstGeom>
           <a:ln>
             <a:solidFill>
-              <a:srgbClr val="FF0000"/>
+              <a:srgbClr val="0000FF"/>
             </a:solidFill>
             <a:tailEnd type="oval"/>
           </a:ln>
@@ -9910,15 +9984,15 @@
         </p:nvCxnSpPr>
         <p:spPr>
           <a:xfrm>
-            <a:off x="1547582" y="4799289"/>
-            <a:ext cx="3424108" cy="53879"/>
+            <a:off x="1140367" y="5228263"/>
+            <a:ext cx="3805405" cy="78435"/>
           </a:xfrm>
           <a:prstGeom prst="bentConnector2">
             <a:avLst/>
           </a:prstGeom>
           <a:ln>
             <a:solidFill>
-              <a:srgbClr val="FF0000"/>
+              <a:srgbClr val="0000FF"/>
             </a:solidFill>
             <a:tailEnd type="oval"/>
           </a:ln>
@@ -9947,9 +10021,9 @@
           <p:nvPr/>
         </p:nvCxnSpPr>
         <p:spPr>
-          <a:xfrm flipV="1">
-            <a:off x="3360121" y="5069190"/>
-            <a:ext cx="977758" cy="2"/>
+          <a:xfrm>
+            <a:off x="3161928" y="5461504"/>
+            <a:ext cx="1150033" cy="61216"/>
           </a:xfrm>
           <a:prstGeom prst="bentConnector3">
             <a:avLst>
@@ -9958,7 +10032,7 @@
           </a:prstGeom>
           <a:ln>
             <a:solidFill>
-              <a:srgbClr val="FF0000"/>
+              <a:srgbClr val="0000FF"/>
             </a:solidFill>
             <a:tailEnd type="oval"/>
           </a:ln>
@@ -9982,14 +10056,13 @@
         <p:nvCxnSpPr>
           <p:cNvPr id="31" name="Straight Arrow Connector 30"/>
           <p:cNvCxnSpPr>
-            <a:stCxn id="13" idx="1"/>
             <a:endCxn id="86" idx="0"/>
           </p:cNvCxnSpPr>
           <p:nvPr/>
         </p:nvCxnSpPr>
         <p:spPr>
           <a:xfrm rot="10800000" flipV="1">
-            <a:off x="5605502" y="5017694"/>
+            <a:off x="5579584" y="5471224"/>
             <a:ext cx="630861" cy="51495"/>
           </a:xfrm>
           <a:prstGeom prst="straightConnector1">
@@ -10024,14 +10097,13 @@
         <p:nvCxnSpPr>
           <p:cNvPr id="34" name="Shape 33"/>
           <p:cNvCxnSpPr>
-            <a:stCxn id="12" idx="1"/>
             <a:endCxn id="86" idx="1"/>
           </p:cNvCxnSpPr>
           <p:nvPr/>
         </p:nvCxnSpPr>
         <p:spPr>
           <a:xfrm rot="10800000">
-            <a:off x="4971690" y="5285212"/>
+            <a:off x="4945772" y="5738742"/>
             <a:ext cx="1190294" cy="176293"/>
           </a:xfrm>
           <a:prstGeom prst="bentConnector2">
@@ -10954,7 +11026,11 @@
             <a:pPr algn="ctr"/>
             <a:r>
               <a:rPr lang="en-US" dirty="0" err="1" smtClean="0"/>
-              <a:t>Campaign_detail</a:t>
+              <a:t>c</a:t>
+            </a:r>
+            <a:r>
+              <a:rPr lang="en-US" dirty="0" err="1" smtClean="0"/>
+              <a:t>ampaign_detail</a:t>
             </a:r>
             <a:endParaRPr lang="en-US" dirty="0"/>
           </a:p>
@@ -11038,7 +11114,7 @@
             <a:pPr algn="ctr"/>
             <a:r>
               <a:rPr lang="en-US" dirty="0" err="1" smtClean="0"/>
-              <a:t>raw_candidate_committees</a:t>
+              <a:t>raw_committees</a:t>
             </a:r>
             <a:endParaRPr lang="en-US" dirty="0"/>
           </a:p>

</xml_diff>